<commit_message>
Updated lecture slides and practicals
</commit_message>
<xml_diff>
--- a/lectures/pptx/0_Introduction.pptx
+++ b/lectures/pptx/0_Introduction.pptx
@@ -5930,27 +5930,7 @@
                 <a:latin typeface="+mj-lt"/>
                 <a:ea typeface="Calibri" panose="020F0502020204030204" pitchFamily="34" charset="0"/>
               </a:rPr>
-              <a:t>Practical’s supervised by Wes Armour, Ian Bush, Karel Adamek, </a:t>
-            </a:r>
-            <a:r>
-              <a:rPr lang="en-GB" sz="1200" dirty="0">
-                <a:solidFill>
-                  <a:srgbClr val="1F497D"/>
-                </a:solidFill>
-                <a:latin typeface="+mj-lt"/>
-                <a:ea typeface="Calibri" panose="020F0502020204030204" pitchFamily="34" charset="0"/>
-              </a:rPr>
-              <a:t>Ania</a:t>
-            </a:r>
-            <a:r>
-              <a:rPr lang="en-GB" sz="1200" dirty="0">
-                <a:solidFill>
-                  <a:srgbClr val="1F497D"/>
-                </a:solidFill>
-                <a:latin typeface="+mj-lt"/>
-                <a:ea typeface="Calibri" panose="020F0502020204030204" pitchFamily="34" charset="0"/>
-              </a:rPr>
-              <a:t> </a:t>
+              <a:t>Practical’s supervised by Wes Armour, Ian Bush, Karel Adamek, Ania </a:t>
             </a:r>
             <a:r>
               <a:rPr lang="en-GB" sz="1200" dirty="0" smtClean="0">
@@ -6465,14 +6445,7 @@
                 <a:latin typeface="+mj-lt"/>
                 <a:ea typeface="Calibri" panose="020F0502020204030204" pitchFamily="34" charset="0"/>
               </a:rPr>
-              <a:t>multi-task on CPUs using </a:t>
-            </a:r>
-            <a:r>
-              <a:rPr lang="en-GB" sz="1100" dirty="0" smtClean="0">
-                <a:latin typeface="+mj-lt"/>
-                <a:ea typeface="Calibri" panose="020F0502020204030204" pitchFamily="34" charset="0"/>
-              </a:rPr>
-              <a:t>OpenMP</a:t>
+              <a:t>multi-task on CPUs using OpenMP</a:t>
             </a:r>
             <a:r>
               <a:rPr lang="en-GB" sz="1100" dirty="0">
@@ -6546,7 +6519,7 @@
                 <a:latin typeface="+mj-lt"/>
                 <a:ea typeface="Calibri" panose="020F0502020204030204" pitchFamily="34" charset="0"/>
               </a:rPr>
-              <a:t>the CUDA programming language.</a:t>
+              <a:t>GPUs and how to use them.</a:t>
             </a:r>
             <a:endParaRPr lang="en-GB" sz="1100" dirty="0">
               <a:latin typeface="+mj-lt"/>
@@ -6564,21 +6537,21 @@
                 <a:latin typeface="+mj-lt"/>
                 <a:ea typeface="Calibri" panose="020F0502020204030204" pitchFamily="34" charset="0"/>
               </a:rPr>
-              <a:t>Afternoon lecture:	Scientific </a:t>
+              <a:t>Afternoon lecture:	</a:t>
             </a:r>
             <a:r>
               <a:rPr lang="en-GB" sz="1100" dirty="0">
                 <a:latin typeface="+mj-lt"/>
                 <a:ea typeface="Calibri" panose="020F0502020204030204" pitchFamily="34" charset="0"/>
               </a:rPr>
-              <a:t>Computing using the CUDA programming language </a:t>
+              <a:t>An introduction to the CUDA programming </a:t>
             </a:r>
             <a:r>
               <a:rPr lang="en-GB" sz="1100" dirty="0" smtClean="0">
                 <a:latin typeface="+mj-lt"/>
                 <a:ea typeface="Calibri" panose="020F0502020204030204" pitchFamily="34" charset="0"/>
               </a:rPr>
-              <a:t>part one.</a:t>
+              <a:t>language.</a:t>
             </a:r>
             <a:endParaRPr lang="en-GB" sz="1100" dirty="0">
               <a:latin typeface="+mj-lt"/>
@@ -7051,21 +7024,7 @@
                 <a:latin typeface="+mj-lt"/>
                 <a:ea typeface="Calibri" panose="020F0502020204030204" pitchFamily="34" charset="0"/>
               </a:rPr>
-              <a:t>using </a:t>
-            </a:r>
-            <a:r>
-              <a:rPr lang="en-GB" sz="1100" dirty="0" smtClean="0">
-                <a:latin typeface="+mj-lt"/>
-                <a:ea typeface="Calibri" panose="020F0502020204030204" pitchFamily="34" charset="0"/>
-              </a:rPr>
-              <a:t>OpenMP</a:t>
-            </a:r>
-            <a:r>
-              <a:rPr lang="en-GB" sz="1100" dirty="0" smtClean="0">
-                <a:latin typeface="+mj-lt"/>
-                <a:ea typeface="Calibri" panose="020F0502020204030204" pitchFamily="34" charset="0"/>
-              </a:rPr>
-              <a:t> on CPUs.</a:t>
+              <a:t>using OpenMP on CPUs.</a:t>
             </a:r>
             <a:endParaRPr lang="en-GB" sz="1100" dirty="0">
               <a:latin typeface="+mj-lt"/>

</xml_diff>

<commit_message>
Updated intro with assignment details
</commit_message>
<xml_diff>
--- a/lectures/pptx/0_Introduction.pptx
+++ b/lectures/pptx/0_Introduction.pptx
@@ -5,10 +5,10 @@
     <p:sldMasterId id="2147483652" r:id="rId4"/>
   </p:sldMasterIdLst>
   <p:notesMasterIdLst>
-    <p:notesMasterId r:id="rId10"/>
+    <p:notesMasterId r:id="rId11"/>
   </p:notesMasterIdLst>
   <p:handoutMasterIdLst>
-    <p:handoutMasterId r:id="rId11"/>
+    <p:handoutMasterId r:id="rId12"/>
   </p:handoutMasterIdLst>
   <p:sldIdLst>
     <p:sldId id="261" r:id="rId5"/>
@@ -16,6 +16,7 @@
     <p:sldId id="428" r:id="rId7"/>
     <p:sldId id="429" r:id="rId8"/>
     <p:sldId id="430" r:id="rId9"/>
+    <p:sldId id="432" r:id="rId10"/>
   </p:sldIdLst>
   <p:sldSz cx="9144000" cy="6858000" type="screen4x3"/>
   <p:notesSz cx="6858000" cy="9144000"/>
@@ -1412,6 +1413,132 @@
     <p:extLst>
       <p:ext uri="{BB962C8B-B14F-4D97-AF65-F5344CB8AC3E}">
         <p14:creationId xmlns:p14="http://schemas.microsoft.com/office/powerpoint/2010/main" val="149972078"/>
+      </p:ext>
+    </p:extLst>
+  </p:cSld>
+  <p:clrMapOvr>
+    <a:masterClrMapping/>
+  </p:clrMapOvr>
+</p:notes>
+</file>
+
+<file path=ppt/notesSlides/notesSlide5.xml><?xml version="1.0" encoding="utf-8"?>
+<p:notes xmlns:a="http://schemas.openxmlformats.org/drawingml/2006/main" xmlns:r="http://schemas.openxmlformats.org/officeDocument/2006/relationships" xmlns:p="http://schemas.openxmlformats.org/presentationml/2006/main">
+  <p:cSld>
+    <p:spTree>
+      <p:nvGrpSpPr>
+        <p:cNvPr id="1" name=""/>
+        <p:cNvGrpSpPr/>
+        <p:nvPr/>
+      </p:nvGrpSpPr>
+      <p:grpSpPr>
+        <a:xfrm>
+          <a:off x="0" y="0"/>
+          <a:ext cx="0" cy="0"/>
+          <a:chOff x="0" y="0"/>
+          <a:chExt cx="0" cy="0"/>
+        </a:xfrm>
+      </p:grpSpPr>
+      <p:sp>
+        <p:nvSpPr>
+          <p:cNvPr id="22529" name="Rectangle 1"/>
+          <p:cNvSpPr>
+            <a:spLocks noGrp="1" noRot="1" noChangeAspect="1" noChangeArrowheads="1"/>
+          </p:cNvSpPr>
+          <p:nvPr>
+            <p:ph type="sldImg"/>
+          </p:nvPr>
+        </p:nvSpPr>
+        <p:spPr bwMode="auto">
+          <a:xfrm>
+            <a:off x="1143000" y="685800"/>
+            <a:ext cx="4572000" cy="3429000"/>
+          </a:xfrm>
+          <a:prstGeom prst="rect">
+            <a:avLst/>
+          </a:prstGeom>
+          <a:solidFill>
+            <a:srgbClr val="FFFFFF"/>
+          </a:solidFill>
+          <a:ln>
+            <a:solidFill>
+              <a:srgbClr val="000000"/>
+            </a:solidFill>
+            <a:miter lim="800000"/>
+            <a:headEnd/>
+            <a:tailEnd/>
+          </a:ln>
+        </p:spPr>
+      </p:sp>
+      <p:sp>
+        <p:nvSpPr>
+          <p:cNvPr id="22530" name="Rectangle 2"/>
+          <p:cNvSpPr>
+            <a:spLocks noGrp="1" noChangeArrowheads="1"/>
+          </p:cNvSpPr>
+          <p:nvPr>
+            <p:ph type="body" idx="1"/>
+          </p:nvPr>
+        </p:nvSpPr>
+        <p:spPr bwMode="auto">
+          <a:xfrm>
+            <a:off x="685800" y="4343400"/>
+            <a:ext cx="5486400" cy="4114800"/>
+          </a:xfrm>
+          <a:prstGeom prst="rect">
+            <a:avLst/>
+          </a:prstGeom>
+          <a:noFill/>
+          <a:ln/>
+          <a:extLst>
+            <a:ext uri="{909E8E84-426E-40DD-AFC4-6F175D3DCCD1}">
+              <a14:hiddenFill xmlns:a14="http://schemas.microsoft.com/office/drawing/2010/main">
+                <a:solidFill>
+                  <a:srgbClr val="FFFFFF"/>
+                </a:solidFill>
+              </a14:hiddenFill>
+            </a:ext>
+            <a:ext uri="{91240B29-F687-4F45-9708-019B960494DF}">
+              <a14:hiddenLine xmlns:a14="http://schemas.microsoft.com/office/drawing/2010/main" w="9525">
+                <a:solidFill>
+                  <a:srgbClr val="000000"/>
+                </a:solidFill>
+                <a:miter lim="800000"/>
+                <a:headEnd/>
+                <a:tailEnd/>
+              </a14:hiddenLine>
+            </a:ext>
+            <a:ext uri="{AF507438-7753-43E0-B8FC-AC1667EBCBE1}">
+              <a14:hiddenEffects xmlns:a14="http://schemas.microsoft.com/office/drawing/2010/main">
+                <a:effectLst>
+                  <a:outerShdw dist="35921" dir="2700000" algn="ctr" rotWithShape="0">
+                    <a:srgbClr val="808080"/>
+                  </a:outerShdw>
+                </a:effectLst>
+              </a14:hiddenEffects>
+            </a:ext>
+            <a:ext uri="{53640926-AAD7-44D8-BBD7-CCE9431645EC}">
+              <a14:shadowObscured xmlns:a14="http://schemas.microsoft.com/office/drawing/2010/main" val="1"/>
+            </a:ext>
+          </a:extLst>
+        </p:spPr>
+        <p:txBody>
+          <a:bodyPr/>
+          <a:lstStyle/>
+          <a:p>
+            <a:endParaRPr lang="en-US" altLang="en-US" sz="2200" dirty="0">
+              <a:latin typeface="Lucida Grande" charset="0"/>
+              <a:ea typeface="Lucida Grande" charset="0"/>
+              <a:cs typeface="Lucida Grande" charset="0"/>
+              <a:sym typeface="Lucida Grande" charset="0"/>
+            </a:endParaRPr>
+          </a:p>
+        </p:txBody>
+      </p:sp>
+    </p:spTree>
+    <p:extLst>
+      <p:ext uri="{BB962C8B-B14F-4D97-AF65-F5344CB8AC3E}">
+        <p14:creationId xmlns:p14="http://schemas.microsoft.com/office/powerpoint/2010/main" val="4039815089"/>
       </p:ext>
     </p:extLst>
   </p:cSld>
@@ -6157,7 +6284,7 @@
         </p:nvSpPr>
         <p:spPr>
           <a:xfrm>
-            <a:off x="1259632" y="1549236"/>
+            <a:off x="1259632" y="1484784"/>
             <a:ext cx="6768752" cy="4832092"/>
           </a:xfrm>
           <a:prstGeom prst="rect">
@@ -6615,14 +6742,14 @@
                 <a:latin typeface="+mj-lt"/>
                 <a:ea typeface="Calibri" panose="020F0502020204030204" pitchFamily="34" charset="0"/>
               </a:rPr>
-              <a:t>Computing using the CUDA programming language </a:t>
+              <a:t>Computing using the CUDA programming </a:t>
             </a:r>
             <a:r>
               <a:rPr lang="en-GB" sz="1100" dirty="0" smtClean="0">
                 <a:latin typeface="+mj-lt"/>
                 <a:ea typeface="Calibri" panose="020F0502020204030204" pitchFamily="34" charset="0"/>
               </a:rPr>
-              <a:t>part two.</a:t>
+              <a:t>language.</a:t>
             </a:r>
             <a:endParaRPr lang="en-GB" sz="1100" dirty="0">
               <a:latin typeface="+mj-lt"/>
@@ -6806,8 +6933,8 @@
         </p:nvSpPr>
         <p:spPr>
           <a:xfrm>
-            <a:off x="1259632" y="1700808"/>
-            <a:ext cx="5616624" cy="3816429"/>
+            <a:off x="1259632" y="1844824"/>
+            <a:ext cx="5976664" cy="3816429"/>
           </a:xfrm>
           <a:prstGeom prst="rect">
             <a:avLst/>
@@ -7088,7 +7215,7 @@
                 <a:latin typeface="+mj-lt"/>
                 <a:ea typeface="Calibri" panose="020F0502020204030204" pitchFamily="34" charset="0"/>
               </a:rPr>
-              <a:t>the CUDA programming language.</a:t>
+              <a:t>using GPUs for science and engineering.</a:t>
             </a:r>
             <a:endParaRPr lang="en-GB" sz="1100" dirty="0">
               <a:latin typeface="+mj-lt"/>
@@ -7106,14 +7233,28 @@
                 <a:latin typeface="+mj-lt"/>
                 <a:ea typeface="Calibri" panose="020F0502020204030204" pitchFamily="34" charset="0"/>
               </a:rPr>
-              <a:t>Afternoon Practical:	Advanced examples of CUDA programming part </a:t>
+              <a:t>Afternoon Practical:	</a:t>
             </a:r>
             <a:r>
               <a:rPr lang="en-GB" sz="1100" dirty="0" smtClean="0">
                 <a:latin typeface="+mj-lt"/>
                 <a:ea typeface="Calibri" panose="020F0502020204030204" pitchFamily="34" charset="0"/>
               </a:rPr>
-              <a:t>one.</a:t>
+              <a:t>Examples </a:t>
+            </a:r>
+            <a:r>
+              <a:rPr lang="en-GB" sz="1100" dirty="0">
+                <a:latin typeface="+mj-lt"/>
+                <a:ea typeface="Calibri" panose="020F0502020204030204" pitchFamily="34" charset="0"/>
+              </a:rPr>
+              <a:t>of CUDA </a:t>
+            </a:r>
+            <a:r>
+              <a:rPr lang="en-GB" sz="1100" dirty="0" smtClean="0">
+                <a:latin typeface="+mj-lt"/>
+                <a:ea typeface="Calibri" panose="020F0502020204030204" pitchFamily="34" charset="0"/>
+              </a:rPr>
+              <a:t>programming.</a:t>
             </a:r>
             <a:endParaRPr lang="en-GB" sz="1100" dirty="0">
               <a:latin typeface="+mj-lt"/>
@@ -7177,15 +7318,19 @@
                 <a:latin typeface="+mj-lt"/>
                 <a:ea typeface="Calibri" panose="020F0502020204030204" pitchFamily="34" charset="0"/>
               </a:rPr>
-              <a:t>	Advanced examples of CUDA programming </a:t>
+              <a:t>	</a:t>
             </a:r>
             <a:r>
               <a:rPr lang="en-GB" sz="1100" dirty="0" smtClean="0">
                 <a:latin typeface="+mj-lt"/>
                 <a:ea typeface="Calibri" panose="020F0502020204030204" pitchFamily="34" charset="0"/>
               </a:rPr>
-              <a:t>part two.</a:t>
-            </a:r>
+              <a:t>Assignment.</a:t>
+            </a:r>
+            <a:endParaRPr lang="en-GB" sz="1100" dirty="0" smtClean="0">
+              <a:latin typeface="+mj-lt"/>
+              <a:ea typeface="Calibri" panose="020F0502020204030204" pitchFamily="34" charset="0"/>
+            </a:endParaRPr>
           </a:p>
           <a:p>
             <a:pPr>
@@ -7212,7 +7357,22 @@
                 <a:latin typeface="+mj-lt"/>
                 <a:ea typeface="Calibri" panose="020F0502020204030204" pitchFamily="34" charset="0"/>
               </a:rPr>
-              <a:t>up.</a:t>
+              <a:t>up (email assignment to </a:t>
+            </a:r>
+            <a:r>
+              <a:rPr lang="en-GB" sz="1100" dirty="0" smtClean="0">
+                <a:latin typeface="+mj-lt"/>
+                <a:ea typeface="Calibri" panose="020F0502020204030204" pitchFamily="34" charset="0"/>
+                <a:hlinkClick r:id="rId3"/>
+              </a:rPr>
+              <a:t>wes.armour@eng.ox.ac.uk</a:t>
+            </a:r>
+            <a:r>
+              <a:rPr lang="en-GB" sz="1100" dirty="0" smtClean="0">
+                <a:latin typeface="+mj-lt"/>
+                <a:ea typeface="Calibri" panose="020F0502020204030204" pitchFamily="34" charset="0"/>
+              </a:rPr>
+              <a:t>).</a:t>
             </a:r>
             <a:endParaRPr lang="en-GB" sz="1100" dirty="0">
               <a:latin typeface="+mj-lt"/>
@@ -7225,6 +7385,286 @@
     <p:extLst>
       <p:ext uri="{BB962C8B-B14F-4D97-AF65-F5344CB8AC3E}">
         <p14:creationId xmlns:p14="http://schemas.microsoft.com/office/powerpoint/2010/main" val="3999317913"/>
+      </p:ext>
+    </p:extLst>
+  </p:cSld>
+  <p:clrMapOvr>
+    <a:masterClrMapping/>
+  </p:clrMapOvr>
+  <mc:AlternateContent xmlns:mc="http://schemas.openxmlformats.org/markup-compatibility/2006" xmlns:p14="http://schemas.microsoft.com/office/powerpoint/2010/main">
+    <mc:Choice Requires="p14">
+      <p:transition spd="slow" p14:dur="2000"/>
+    </mc:Choice>
+    <mc:Fallback xmlns="">
+      <p:transition spd="slow"/>
+    </mc:Fallback>
+  </mc:AlternateContent>
+  <p:timing>
+    <p:tnLst>
+      <p:par>
+        <p:cTn id="1" dur="indefinite" restart="never" nodeType="tmRoot"/>
+      </p:par>
+    </p:tnLst>
+  </p:timing>
+</p:sld>
+</file>
+
+<file path=ppt/slides/slide6.xml><?xml version="1.0" encoding="utf-8"?>
+<p:sld xmlns:a="http://schemas.openxmlformats.org/drawingml/2006/main" xmlns:r="http://schemas.openxmlformats.org/officeDocument/2006/relationships" xmlns:p="http://schemas.openxmlformats.org/presentationml/2006/main">
+  <p:cSld>
+    <p:spTree>
+      <p:nvGrpSpPr>
+        <p:cNvPr id="1" name=""/>
+        <p:cNvGrpSpPr/>
+        <p:nvPr/>
+      </p:nvGrpSpPr>
+      <p:grpSpPr>
+        <a:xfrm>
+          <a:off x="0" y="0"/>
+          <a:ext cx="0" cy="0"/>
+          <a:chOff x="0" y="0"/>
+          <a:chExt cx="0" cy="0"/>
+        </a:xfrm>
+      </p:grpSpPr>
+      <p:sp>
+        <p:nvSpPr>
+          <p:cNvPr id="2" name="Rectangle 1"/>
+          <p:cNvSpPr/>
+          <p:nvPr/>
+        </p:nvSpPr>
+        <p:spPr>
+          <a:xfrm>
+            <a:off x="539552" y="476673"/>
+            <a:ext cx="2952328" cy="461665"/>
+          </a:xfrm>
+          <a:prstGeom prst="rect">
+            <a:avLst/>
+          </a:prstGeom>
+        </p:spPr>
+        <p:txBody>
+          <a:bodyPr wrap="square">
+            <a:spAutoFit/>
+          </a:bodyPr>
+          <a:lstStyle/>
+          <a:p>
+            <a:r>
+              <a:rPr lang="en-GB" b="1" dirty="0" smtClean="0">
+                <a:solidFill>
+                  <a:schemeClr val="bg1"/>
+                </a:solidFill>
+                <a:latin typeface="Arial" panose="020B0604020202020204" pitchFamily="34" charset="0"/>
+              </a:rPr>
+              <a:t>Assignment</a:t>
+            </a:r>
+            <a:endParaRPr lang="en-GB" b="1" dirty="0">
+              <a:solidFill>
+                <a:schemeClr val="bg1"/>
+              </a:solidFill>
+              <a:latin typeface="Arial" panose="020B0604020202020204" pitchFamily="34" charset="0"/>
+            </a:endParaRPr>
+          </a:p>
+        </p:txBody>
+      </p:sp>
+      <p:sp>
+        <p:nvSpPr>
+          <p:cNvPr id="4" name="Rectangle 3"/>
+          <p:cNvSpPr/>
+          <p:nvPr/>
+        </p:nvSpPr>
+        <p:spPr>
+          <a:xfrm>
+            <a:off x="2339752" y="2564904"/>
+            <a:ext cx="5976664" cy="2123658"/>
+          </a:xfrm>
+          <a:prstGeom prst="rect">
+            <a:avLst/>
+          </a:prstGeom>
+        </p:spPr>
+        <p:txBody>
+          <a:bodyPr wrap="square">
+            <a:spAutoFit/>
+          </a:bodyPr>
+          <a:lstStyle/>
+          <a:p>
+            <a:pPr>
+              <a:spcAft>
+                <a:spcPts val="0"/>
+              </a:spcAft>
+            </a:pPr>
+            <a:r>
+              <a:rPr lang="en-GB" sz="1100" b="1" dirty="0" smtClean="0">
+                <a:latin typeface="+mj-lt"/>
+                <a:ea typeface="Calibri" panose="020F0502020204030204" pitchFamily="34" charset="0"/>
+              </a:rPr>
+              <a:t>Course marks</a:t>
+            </a:r>
+          </a:p>
+          <a:p>
+            <a:pPr>
+              <a:spcAft>
+                <a:spcPts val="0"/>
+              </a:spcAft>
+            </a:pPr>
+            <a:endParaRPr lang="en-GB" sz="1100" b="1" dirty="0">
+              <a:latin typeface="+mj-lt"/>
+              <a:ea typeface="Calibri" panose="020F0502020204030204" pitchFamily="34" charset="0"/>
+            </a:endParaRPr>
+          </a:p>
+          <a:p>
+            <a:pPr>
+              <a:spcAft>
+                <a:spcPts val="0"/>
+              </a:spcAft>
+            </a:pPr>
+            <a:r>
+              <a:rPr lang="en-GB" sz="1100" dirty="0" smtClean="0">
+                <a:latin typeface="+mj-lt"/>
+                <a:ea typeface="Calibri" panose="020F0502020204030204" pitchFamily="34" charset="0"/>
+              </a:rPr>
+              <a:t>A total of 9 marks. </a:t>
+            </a:r>
+          </a:p>
+          <a:p>
+            <a:pPr>
+              <a:spcAft>
+                <a:spcPts val="0"/>
+              </a:spcAft>
+            </a:pPr>
+            <a:endParaRPr lang="en-GB" sz="1100" dirty="0">
+              <a:latin typeface="+mj-lt"/>
+              <a:ea typeface="Calibri" panose="020F0502020204030204" pitchFamily="34" charset="0"/>
+            </a:endParaRPr>
+          </a:p>
+          <a:p>
+            <a:pPr>
+              <a:spcAft>
+                <a:spcPts val="0"/>
+              </a:spcAft>
+            </a:pPr>
+            <a:r>
+              <a:rPr lang="en-GB" sz="1100" dirty="0" smtClean="0">
+                <a:latin typeface="+mj-lt"/>
+                <a:ea typeface="Calibri" panose="020F0502020204030204" pitchFamily="34" charset="0"/>
+              </a:rPr>
+              <a:t>4 marks will be given for attendance, 5 marks for assignment work.</a:t>
+            </a:r>
+          </a:p>
+          <a:p>
+            <a:pPr>
+              <a:spcAft>
+                <a:spcPts val="0"/>
+              </a:spcAft>
+            </a:pPr>
+            <a:endParaRPr lang="en-GB" sz="1100" b="1" dirty="0">
+              <a:latin typeface="+mj-lt"/>
+              <a:ea typeface="Calibri" panose="020F0502020204030204" pitchFamily="34" charset="0"/>
+            </a:endParaRPr>
+          </a:p>
+          <a:p>
+            <a:pPr>
+              <a:spcAft>
+                <a:spcPts val="0"/>
+              </a:spcAft>
+            </a:pPr>
+            <a:r>
+              <a:rPr lang="en-GB" sz="1100" b="1" dirty="0" smtClean="0">
+                <a:latin typeface="+mj-lt"/>
+                <a:ea typeface="Calibri" panose="020F0502020204030204" pitchFamily="34" charset="0"/>
+              </a:rPr>
+              <a:t>Assignment</a:t>
+            </a:r>
+            <a:r>
+              <a:rPr lang="en-GB" sz="1100" b="1" dirty="0">
+                <a:latin typeface="+mj-lt"/>
+                <a:ea typeface="Calibri" panose="020F0502020204030204" pitchFamily="34" charset="0"/>
+              </a:rPr>
+              <a:t> </a:t>
+            </a:r>
+            <a:r>
+              <a:rPr lang="en-GB" sz="1100" b="1" dirty="0" smtClean="0">
+                <a:latin typeface="+mj-lt"/>
+                <a:ea typeface="Calibri" panose="020F0502020204030204" pitchFamily="34" charset="0"/>
+              </a:rPr>
+              <a:t>marks will be given for:</a:t>
+            </a:r>
+          </a:p>
+          <a:p>
+            <a:pPr>
+              <a:spcAft>
+                <a:spcPts val="0"/>
+              </a:spcAft>
+            </a:pPr>
+            <a:endParaRPr lang="en-GB" sz="1100" dirty="0">
+              <a:latin typeface="+mj-lt"/>
+              <a:ea typeface="Calibri" panose="020F0502020204030204" pitchFamily="34" charset="0"/>
+            </a:endParaRPr>
+          </a:p>
+          <a:p>
+            <a:pPr>
+              <a:spcAft>
+                <a:spcPts val="0"/>
+              </a:spcAft>
+            </a:pPr>
+            <a:r>
+              <a:rPr lang="en-GB" sz="1100" dirty="0" smtClean="0">
+                <a:latin typeface="+mj-lt"/>
+                <a:ea typeface="Calibri" panose="020F0502020204030204" pitchFamily="34" charset="0"/>
+              </a:rPr>
+              <a:t>Good coding practices	- 2 marks.</a:t>
+            </a:r>
+          </a:p>
+          <a:p>
+            <a:pPr>
+              <a:spcAft>
+                <a:spcPts val="0"/>
+              </a:spcAft>
+            </a:pPr>
+            <a:r>
+              <a:rPr lang="en-GB" sz="1100" dirty="0" smtClean="0">
+                <a:latin typeface="+mj-lt"/>
+                <a:ea typeface="Calibri" panose="020F0502020204030204" pitchFamily="34" charset="0"/>
+              </a:rPr>
+              <a:t>Using a build system	- 1 mark.</a:t>
+            </a:r>
+          </a:p>
+          <a:p>
+            <a:pPr>
+              <a:spcAft>
+                <a:spcPts val="0"/>
+              </a:spcAft>
+            </a:pPr>
+            <a:r>
+              <a:rPr lang="en-GB" sz="1100" dirty="0" smtClean="0">
+                <a:latin typeface="+mj-lt"/>
+                <a:ea typeface="Calibri" panose="020F0502020204030204" pitchFamily="34" charset="0"/>
+              </a:rPr>
+              <a:t>Correct use of C/CUDA	- 1 mark.</a:t>
+            </a:r>
+          </a:p>
+          <a:p>
+            <a:pPr>
+              <a:spcAft>
+                <a:spcPts val="0"/>
+              </a:spcAft>
+            </a:pPr>
+            <a:r>
+              <a:rPr lang="en-GB" sz="1100" dirty="0" smtClean="0">
+                <a:latin typeface="+mj-lt"/>
+                <a:ea typeface="Calibri" panose="020F0502020204030204" pitchFamily="34" charset="0"/>
+              </a:rPr>
+              <a:t>Working code		- 1 mark.</a:t>
+            </a:r>
+            <a:endParaRPr lang="en-GB" sz="1100" dirty="0" smtClean="0">
+              <a:latin typeface="+mj-lt"/>
+              <a:ea typeface="Calibri" panose="020F0502020204030204" pitchFamily="34" charset="0"/>
+            </a:endParaRPr>
+          </a:p>
+        </p:txBody>
+      </p:sp>
+    </p:spTree>
+    <p:extLst>
+      <p:ext uri="{BB962C8B-B14F-4D97-AF65-F5344CB8AC3E}">
+        <p14:creationId xmlns:p14="http://schemas.microsoft.com/office/powerpoint/2010/main" val="1186690937"/>
       </p:ext>
     </p:extLst>
   </p:cSld>
@@ -7555,7 +7995,7 @@
         <a:effectLst/>
         <a:extLst>
           <a:ext uri="{AF507438-7753-43e0-B8FC-AC1667EBCBE1}">
-            <a14:hiddenEffects xmlns="" xmlns:a14="http://schemas.microsoft.com/office/drawing/2010/main">
+            <a14:hiddenEffects xmlns:a14="http://schemas.microsoft.com/office/drawing/2010/main" xmlns="">
               <a:effectLst>
                 <a:outerShdw blurRad="63500" dist="38099" dir="2700000" algn="ctr" rotWithShape="0">
                   <a:schemeClr val="bg2">
@@ -7631,7 +8071,7 @@
         <a:effectLst/>
         <a:extLst>
           <a:ext uri="{AF507438-7753-43e0-B8FC-AC1667EBCBE1}">
-            <a14:hiddenEffects xmlns="" xmlns:a14="http://schemas.microsoft.com/office/drawing/2010/main">
+            <a14:hiddenEffects xmlns:a14="http://schemas.microsoft.com/office/drawing/2010/main" xmlns="">
               <a:effectLst>
                 <a:outerShdw blurRad="63500" dist="38099" dir="2700000" algn="ctr" rotWithShape="0">
                   <a:schemeClr val="bg2">
@@ -8694,6 +9134,15 @@
 </file>
 
 <file path=customXml/item1.xml><?xml version="1.0" encoding="utf-8"?>
+<p:properties xmlns:p="http://schemas.microsoft.com/office/2006/metadata/properties" xmlns:xsi="http://www.w3.org/2001/XMLSchema-instance" xmlns:pc="http://schemas.microsoft.com/office/infopath/2007/PartnerControls">
+  <documentManagement>
+    <PublishingExpirationDate xmlns="http://schemas.microsoft.com/sharepoint/v3" xsi:nil="true"/>
+    <PublishingStartDate xmlns="http://schemas.microsoft.com/sharepoint/v3" xsi:nil="true"/>
+  </documentManagement>
+</p:properties>
+</file>
+
+<file path=customXml/item2.xml><?xml version="1.0" encoding="utf-8"?>
 <ct:contentTypeSchema xmlns:ct="http://schemas.microsoft.com/office/2006/metadata/contentType" xmlns:ma="http://schemas.microsoft.com/office/2006/metadata/properties/metaAttributes" ct:_="" ma:_="" ma:contentTypeName="Document" ma:contentTypeID="0x010100F087B862386F8A48840A2142C0600765" ma:contentTypeVersion="1" ma:contentTypeDescription="Create a new document." ma:contentTypeScope="" ma:versionID="68e7a6ad2ab34d836eda56dc5c7bc733">
   <xsd:schema xmlns:xsd="http://www.w3.org/2001/XMLSchema" xmlns:xs="http://www.w3.org/2001/XMLSchema" xmlns:p="http://schemas.microsoft.com/office/2006/metadata/properties" xmlns:ns1="http://schemas.microsoft.com/sharepoint/v3" targetNamespace="http://schemas.microsoft.com/office/2006/metadata/properties" ma:root="true" ma:fieldsID="48c5b5cd9b8d25ff6dd15848836f4270" ns1:_="">
     <xsd:import namespace="http://schemas.microsoft.com/sharepoint/v3"/>
@@ -8825,15 +9274,6 @@
 </ct:contentTypeSchema>
 </file>
 
-<file path=customXml/item2.xml><?xml version="1.0" encoding="utf-8"?>
-<p:properties xmlns:p="http://schemas.microsoft.com/office/2006/metadata/properties" xmlns:xsi="http://www.w3.org/2001/XMLSchema-instance" xmlns:pc="http://schemas.microsoft.com/office/infopath/2007/PartnerControls">
-  <documentManagement>
-    <PublishingExpirationDate xmlns="http://schemas.microsoft.com/sharepoint/v3" xsi:nil="true"/>
-    <PublishingStartDate xmlns="http://schemas.microsoft.com/sharepoint/v3" xsi:nil="true"/>
-  </documentManagement>
-</p:properties>
-</file>
-
 <file path=customXml/item3.xml><?xml version="1.0" encoding="utf-8"?>
 <?mso-contentType ?>
 <FormTemplates xmlns="http://schemas.microsoft.com/sharepoint/v3/contenttype/forms">
@@ -8844,6 +9284,22 @@
 </file>
 
 <file path=customXml/itemProps1.xml><?xml version="1.0" encoding="utf-8"?>
+<ds:datastoreItem xmlns:ds="http://schemas.openxmlformats.org/officeDocument/2006/customXml" ds:itemID="{D83787E9-855B-43BD-8382-B7C63B9BC33D}">
+  <ds:schemaRefs>
+    <ds:schemaRef ds:uri="http://schemas.microsoft.com/office/2006/metadata/properties"/>
+    <ds:schemaRef ds:uri="http://schemas.microsoft.com/sharepoint/v3"/>
+    <ds:schemaRef ds:uri="http://purl.org/dc/terms/"/>
+    <ds:schemaRef ds:uri="http://schemas.openxmlformats.org/package/2006/metadata/core-properties"/>
+    <ds:schemaRef ds:uri="http://schemas.microsoft.com/office/2006/documentManagement/types"/>
+    <ds:schemaRef ds:uri="http://schemas.microsoft.com/office/infopath/2007/PartnerControls"/>
+    <ds:schemaRef ds:uri="http://purl.org/dc/elements/1.1/"/>
+    <ds:schemaRef ds:uri="http://www.w3.org/XML/1998/namespace"/>
+    <ds:schemaRef ds:uri="http://purl.org/dc/dcmitype/"/>
+  </ds:schemaRefs>
+</ds:datastoreItem>
+</file>
+
+<file path=customXml/itemProps2.xml><?xml version="1.0" encoding="utf-8"?>
 <ds:datastoreItem xmlns:ds="http://schemas.openxmlformats.org/officeDocument/2006/customXml" ds:itemID="{866DD9C6-787C-4079-86E8-1446954686C6}">
   <ds:schemaRefs>
     <ds:schemaRef ds:uri="http://schemas.microsoft.com/office/2006/metadata/contentType"/>
@@ -8861,22 +9317,6 @@
 </ds:datastoreItem>
 </file>
 
-<file path=customXml/itemProps2.xml><?xml version="1.0" encoding="utf-8"?>
-<ds:datastoreItem xmlns:ds="http://schemas.openxmlformats.org/officeDocument/2006/customXml" ds:itemID="{D83787E9-855B-43BD-8382-B7C63B9BC33D}">
-  <ds:schemaRefs>
-    <ds:schemaRef ds:uri="http://schemas.microsoft.com/office/2006/metadata/properties"/>
-    <ds:schemaRef ds:uri="http://schemas.microsoft.com/sharepoint/v3"/>
-    <ds:schemaRef ds:uri="http://purl.org/dc/terms/"/>
-    <ds:schemaRef ds:uri="http://schemas.openxmlformats.org/package/2006/metadata/core-properties"/>
-    <ds:schemaRef ds:uri="http://schemas.microsoft.com/office/2006/documentManagement/types"/>
-    <ds:schemaRef ds:uri="http://schemas.microsoft.com/office/infopath/2007/PartnerControls"/>
-    <ds:schemaRef ds:uri="http://purl.org/dc/elements/1.1/"/>
-    <ds:schemaRef ds:uri="http://www.w3.org/XML/1998/namespace"/>
-    <ds:schemaRef ds:uri="http://purl.org/dc/dcmitype/"/>
-  </ds:schemaRefs>
-</ds:datastoreItem>
-</file>
-
 <file path=customXml/itemProps3.xml><?xml version="1.0" encoding="utf-8"?>
 <ds:datastoreItem xmlns:ds="http://schemas.openxmlformats.org/officeDocument/2006/customXml" ds:itemID="{2E0637EC-CEA5-409F-B139-003005A14145}">
   <ds:schemaRefs>

</xml_diff>

<commit_message>
Updated NVIDIA guest lecture
</commit_message>
<xml_diff>
--- a/lectures/pptx/0_Introduction.pptx
+++ b/lectures/pptx/0_Introduction.pptx
@@ -5,10 +5,10 @@
     <p:sldMasterId id="2147483652" r:id="rId4"/>
   </p:sldMasterIdLst>
   <p:notesMasterIdLst>
-    <p:notesMasterId r:id="rId11"/>
+    <p:notesMasterId r:id="rId12"/>
   </p:notesMasterIdLst>
   <p:handoutMasterIdLst>
-    <p:handoutMasterId r:id="rId12"/>
+    <p:handoutMasterId r:id="rId13"/>
   </p:handoutMasterIdLst>
   <p:sldIdLst>
     <p:sldId id="261" r:id="rId5"/>
@@ -16,7 +16,8 @@
     <p:sldId id="428" r:id="rId7"/>
     <p:sldId id="429" r:id="rId8"/>
     <p:sldId id="430" r:id="rId9"/>
-    <p:sldId id="432" r:id="rId10"/>
+    <p:sldId id="433" r:id="rId10"/>
+    <p:sldId id="432" r:id="rId11"/>
   </p:sldIdLst>
   <p:sldSz cx="9144000" cy="6858000" type="screen4x3"/>
   <p:notesSz cx="6858000" cy="9144000"/>
@@ -1423,6 +1424,132 @@
 </file>
 
 <file path=ppt/notesSlides/notesSlide5.xml><?xml version="1.0" encoding="utf-8"?>
+<p:notes xmlns:a="http://schemas.openxmlformats.org/drawingml/2006/main" xmlns:r="http://schemas.openxmlformats.org/officeDocument/2006/relationships" xmlns:p="http://schemas.openxmlformats.org/presentationml/2006/main">
+  <p:cSld>
+    <p:spTree>
+      <p:nvGrpSpPr>
+        <p:cNvPr id="1" name=""/>
+        <p:cNvGrpSpPr/>
+        <p:nvPr/>
+      </p:nvGrpSpPr>
+      <p:grpSpPr>
+        <a:xfrm>
+          <a:off x="0" y="0"/>
+          <a:ext cx="0" cy="0"/>
+          <a:chOff x="0" y="0"/>
+          <a:chExt cx="0" cy="0"/>
+        </a:xfrm>
+      </p:grpSpPr>
+      <p:sp>
+        <p:nvSpPr>
+          <p:cNvPr id="22529" name="Rectangle 1"/>
+          <p:cNvSpPr>
+            <a:spLocks noGrp="1" noRot="1" noChangeAspect="1" noChangeArrowheads="1"/>
+          </p:cNvSpPr>
+          <p:nvPr>
+            <p:ph type="sldImg"/>
+          </p:nvPr>
+        </p:nvSpPr>
+        <p:spPr bwMode="auto">
+          <a:xfrm>
+            <a:off x="1143000" y="685800"/>
+            <a:ext cx="4572000" cy="3429000"/>
+          </a:xfrm>
+          <a:prstGeom prst="rect">
+            <a:avLst/>
+          </a:prstGeom>
+          <a:solidFill>
+            <a:srgbClr val="FFFFFF"/>
+          </a:solidFill>
+          <a:ln>
+            <a:solidFill>
+              <a:srgbClr val="000000"/>
+            </a:solidFill>
+            <a:miter lim="800000"/>
+            <a:headEnd/>
+            <a:tailEnd/>
+          </a:ln>
+        </p:spPr>
+      </p:sp>
+      <p:sp>
+        <p:nvSpPr>
+          <p:cNvPr id="22530" name="Rectangle 2"/>
+          <p:cNvSpPr>
+            <a:spLocks noGrp="1" noChangeArrowheads="1"/>
+          </p:cNvSpPr>
+          <p:nvPr>
+            <p:ph type="body" idx="1"/>
+          </p:nvPr>
+        </p:nvSpPr>
+        <p:spPr bwMode="auto">
+          <a:xfrm>
+            <a:off x="685800" y="4343400"/>
+            <a:ext cx="5486400" cy="4114800"/>
+          </a:xfrm>
+          <a:prstGeom prst="rect">
+            <a:avLst/>
+          </a:prstGeom>
+          <a:noFill/>
+          <a:ln/>
+          <a:extLst>
+            <a:ext uri="{909E8E84-426E-40DD-AFC4-6F175D3DCCD1}">
+              <a14:hiddenFill xmlns:a14="http://schemas.microsoft.com/office/drawing/2010/main">
+                <a:solidFill>
+                  <a:srgbClr val="FFFFFF"/>
+                </a:solidFill>
+              </a14:hiddenFill>
+            </a:ext>
+            <a:ext uri="{91240B29-F687-4F45-9708-019B960494DF}">
+              <a14:hiddenLine xmlns:a14="http://schemas.microsoft.com/office/drawing/2010/main" w="9525">
+                <a:solidFill>
+                  <a:srgbClr val="000000"/>
+                </a:solidFill>
+                <a:miter lim="800000"/>
+                <a:headEnd/>
+                <a:tailEnd/>
+              </a14:hiddenLine>
+            </a:ext>
+            <a:ext uri="{AF507438-7753-43E0-B8FC-AC1667EBCBE1}">
+              <a14:hiddenEffects xmlns:a14="http://schemas.microsoft.com/office/drawing/2010/main">
+                <a:effectLst>
+                  <a:outerShdw dist="35921" dir="2700000" algn="ctr" rotWithShape="0">
+                    <a:srgbClr val="808080"/>
+                  </a:outerShdw>
+                </a:effectLst>
+              </a14:hiddenEffects>
+            </a:ext>
+            <a:ext uri="{53640926-AAD7-44D8-BBD7-CCE9431645EC}">
+              <a14:shadowObscured xmlns:a14="http://schemas.microsoft.com/office/drawing/2010/main" val="1"/>
+            </a:ext>
+          </a:extLst>
+        </p:spPr>
+        <p:txBody>
+          <a:bodyPr/>
+          <a:lstStyle/>
+          <a:p>
+            <a:endParaRPr lang="en-US" altLang="en-US" sz="2200" dirty="0">
+              <a:latin typeface="Lucida Grande" charset="0"/>
+              <a:ea typeface="Lucida Grande" charset="0"/>
+              <a:cs typeface="Lucida Grande" charset="0"/>
+              <a:sym typeface="Lucida Grande" charset="0"/>
+            </a:endParaRPr>
+          </a:p>
+        </p:txBody>
+      </p:sp>
+    </p:spTree>
+    <p:extLst>
+      <p:ext uri="{BB962C8B-B14F-4D97-AF65-F5344CB8AC3E}">
+        <p14:creationId xmlns:p14="http://schemas.microsoft.com/office/powerpoint/2010/main" val="2032404177"/>
+      </p:ext>
+    </p:extLst>
+  </p:cSld>
+  <p:clrMapOvr>
+    <a:masterClrMapping/>
+  </p:clrMapOvr>
+</p:notes>
+</file>
+
+<file path=ppt/notesSlides/notesSlide6.xml><?xml version="1.0" encoding="utf-8"?>
 <p:notes xmlns:a="http://schemas.openxmlformats.org/drawingml/2006/main" xmlns:r="http://schemas.openxmlformats.org/officeDocument/2006/relationships" xmlns:p="http://schemas.openxmlformats.org/presentationml/2006/main">
   <p:cSld>
     <p:spTree>
@@ -6780,7 +6907,7 @@
                 <a:latin typeface="+mj-lt"/>
                 <a:ea typeface="Calibri" panose="020F0502020204030204" pitchFamily="34" charset="0"/>
               </a:rPr>
-              <a:t>Lecture: Deep learning Demystified -  Adam Grzywaczewski NVIDIA</a:t>
+              <a:t>Lecture: Deep Learning and challenges of </a:t>
             </a:r>
             <a:r>
               <a:rPr lang="en-GB" sz="1100" b="1" i="1" dirty="0" smtClean="0">
@@ -6790,7 +6917,54 @@
                 <a:latin typeface="+mj-lt"/>
                 <a:ea typeface="Calibri" panose="020F0502020204030204" pitchFamily="34" charset="0"/>
               </a:rPr>
-              <a:t>.</a:t>
+              <a:t>scale</a:t>
+            </a:r>
+          </a:p>
+          <a:p>
+            <a:pPr>
+              <a:spcAft>
+                <a:spcPts val="0"/>
+              </a:spcAft>
+            </a:pPr>
+            <a:r>
+              <a:rPr lang="en-GB" sz="1100" b="1" i="1" dirty="0">
+                <a:solidFill>
+                  <a:srgbClr val="00B050"/>
+                </a:solidFill>
+                <a:latin typeface="+mj-lt"/>
+                <a:ea typeface="Calibri" panose="020F0502020204030204" pitchFamily="34" charset="0"/>
+              </a:rPr>
+              <a:t>	</a:t>
+            </a:r>
+            <a:r>
+              <a:rPr lang="en-GB" sz="1100" b="1" i="1" dirty="0" smtClean="0">
+                <a:solidFill>
+                  <a:srgbClr val="00B050"/>
+                </a:solidFill>
+                <a:latin typeface="+mj-lt"/>
+                <a:ea typeface="Calibri" panose="020F0502020204030204" pitchFamily="34" charset="0"/>
+              </a:rPr>
+              <a:t>		 </a:t>
+            </a:r>
+            <a:r>
+              <a:rPr lang="en-GB" sz="1100" b="1" i="1" dirty="0">
+                <a:solidFill>
+                  <a:srgbClr val="00B050"/>
+                </a:solidFill>
+                <a:latin typeface="+mj-lt"/>
+                <a:ea typeface="Calibri" panose="020F0502020204030204" pitchFamily="34" charset="0"/>
+              </a:rPr>
+              <a:t>-  Adam Grzywaczewski </a:t>
+            </a:r>
+            <a:r>
+              <a:rPr lang="en-GB" sz="1100" b="1" i="1" dirty="0" smtClean="0">
+                <a:solidFill>
+                  <a:srgbClr val="00B050"/>
+                </a:solidFill>
+                <a:latin typeface="+mj-lt"/>
+                <a:ea typeface="Calibri" panose="020F0502020204030204" pitchFamily="34" charset="0"/>
+              </a:rPr>
+              <a:t>(NVIDIA).</a:t>
             </a:r>
             <a:endParaRPr lang="en-GB" sz="1100" b="1" i="1" dirty="0">
               <a:solidFill>
@@ -7327,10 +7501,6 @@
               </a:rPr>
               <a:t>Assignment.</a:t>
             </a:r>
-            <a:endParaRPr lang="en-GB" sz="1100" dirty="0" smtClean="0">
-              <a:latin typeface="+mj-lt"/>
-              <a:ea typeface="Calibri" panose="020F0502020204030204" pitchFamily="34" charset="0"/>
-            </a:endParaRPr>
           </a:p>
           <a:p>
             <a:pPr>
@@ -7435,6 +7605,233 @@
         <p:spPr>
           <a:xfrm>
             <a:off x="539552" y="476673"/>
+            <a:ext cx="6552728" cy="461665"/>
+          </a:xfrm>
+          <a:prstGeom prst="rect">
+            <a:avLst/>
+          </a:prstGeom>
+        </p:spPr>
+        <p:txBody>
+          <a:bodyPr wrap="square">
+            <a:spAutoFit/>
+          </a:bodyPr>
+          <a:lstStyle/>
+          <a:p>
+            <a:r>
+              <a:rPr lang="en-GB" b="1" dirty="0" smtClean="0">
+                <a:solidFill>
+                  <a:schemeClr val="bg1"/>
+                </a:solidFill>
+                <a:latin typeface="Arial" panose="020B0604020202020204" pitchFamily="34" charset="0"/>
+              </a:rPr>
+              <a:t>NVIDIA Guest lecture</a:t>
+            </a:r>
+            <a:endParaRPr lang="en-GB" b="1" dirty="0">
+              <a:solidFill>
+                <a:schemeClr val="bg1"/>
+              </a:solidFill>
+              <a:latin typeface="Arial" panose="020B0604020202020204" pitchFamily="34" charset="0"/>
+            </a:endParaRPr>
+          </a:p>
+        </p:txBody>
+      </p:sp>
+      <p:sp>
+        <p:nvSpPr>
+          <p:cNvPr id="3" name="Rectangle 2"/>
+          <p:cNvSpPr/>
+          <p:nvPr/>
+        </p:nvSpPr>
+        <p:spPr>
+          <a:xfrm>
+            <a:off x="899592" y="1700808"/>
+            <a:ext cx="7560840" cy="4062651"/>
+          </a:xfrm>
+          <a:prstGeom prst="rect">
+            <a:avLst/>
+          </a:prstGeom>
+        </p:spPr>
+        <p:txBody>
+          <a:bodyPr wrap="square">
+            <a:spAutoFit/>
+          </a:bodyPr>
+          <a:lstStyle/>
+          <a:p>
+            <a:pPr lvl="0">
+              <a:spcAft>
+                <a:spcPts val="0"/>
+              </a:spcAft>
+              <a:buSzPts val="1000"/>
+              <a:tabLst>
+                <a:tab pos="457200" algn="l"/>
+              </a:tabLst>
+            </a:pPr>
+            <a:r>
+              <a:rPr lang="en-GB" sz="1600" b="1" dirty="0" smtClean="0">
+                <a:latin typeface="+mn-lt"/>
+                <a:ea typeface="Times New Roman" panose="02020603050405020304" pitchFamily="18" charset="0"/>
+              </a:rPr>
+              <a:t>Abstract</a:t>
+            </a:r>
+          </a:p>
+          <a:p>
+            <a:pPr lvl="0">
+              <a:spcAft>
+                <a:spcPts val="0"/>
+              </a:spcAft>
+              <a:buSzPts val="1000"/>
+              <a:tabLst>
+                <a:tab pos="457200" algn="l"/>
+              </a:tabLst>
+            </a:pPr>
+            <a:r>
+              <a:rPr lang="en-GB" sz="1400" dirty="0" smtClean="0">
+                <a:latin typeface="+mn-lt"/>
+                <a:ea typeface="Times New Roman" panose="02020603050405020304" pitchFamily="18" charset="0"/>
+              </a:rPr>
+              <a:t>Majority </a:t>
+            </a:r>
+            <a:r>
+              <a:rPr lang="en-GB" sz="1400" dirty="0">
+                <a:latin typeface="+mn-lt"/>
+                <a:ea typeface="Times New Roman" panose="02020603050405020304" pitchFamily="18" charset="0"/>
+              </a:rPr>
+              <a:t>of interesting problems tackled by industry are fairly complex. Where it is relatively easy to build an early POC of a system it takes a huge amount of effort to build a solution meeting all of your functional as well as non-functional requirements. For example its fairly straightforward to build a POC Self Driving Vehicle that will drive across a small number of streets with human supervision. On the other hand building a Self-Driving Car which a robust and safe is an engineering feet requiring petabytes of data for training and validation. In this talk we will tackle some of the key challenges of building complex Deep Learning based systems with a primary focus on scalability of the training process</a:t>
+            </a:r>
+            <a:r>
+              <a:rPr lang="en-GB" sz="1400" dirty="0" smtClean="0">
+                <a:latin typeface="+mn-lt"/>
+                <a:ea typeface="Times New Roman" panose="02020603050405020304" pitchFamily="18" charset="0"/>
+              </a:rPr>
+              <a:t>.</a:t>
+            </a:r>
+          </a:p>
+          <a:p>
+            <a:pPr lvl="0">
+              <a:spcAft>
+                <a:spcPts val="0"/>
+              </a:spcAft>
+              <a:buSzPts val="1000"/>
+              <a:tabLst>
+                <a:tab pos="457200" algn="l"/>
+              </a:tabLst>
+            </a:pPr>
+            <a:endParaRPr lang="en-GB" sz="1600" dirty="0">
+              <a:effectLst/>
+              <a:latin typeface="+mn-lt"/>
+              <a:ea typeface="Calibri" panose="020F0502020204030204" pitchFamily="34" charset="0"/>
+            </a:endParaRPr>
+          </a:p>
+          <a:p>
+            <a:pPr lvl="0">
+              <a:spcAft>
+                <a:spcPts val="0"/>
+              </a:spcAft>
+              <a:buSzPts val="1000"/>
+              <a:tabLst>
+                <a:tab pos="457200" algn="l"/>
+              </a:tabLst>
+            </a:pPr>
+            <a:r>
+              <a:rPr lang="en-GB" sz="1600" b="1" dirty="0" smtClean="0">
+                <a:latin typeface="+mn-lt"/>
+                <a:ea typeface="Calibri" panose="020F0502020204030204" pitchFamily="34" charset="0"/>
+              </a:rPr>
+              <a:t>Bio</a:t>
+            </a:r>
+          </a:p>
+          <a:p>
+            <a:pPr lvl="0">
+              <a:spcAft>
+                <a:spcPts val="0"/>
+              </a:spcAft>
+              <a:buSzPts val="1000"/>
+              <a:tabLst>
+                <a:tab pos="457200" algn="l"/>
+              </a:tabLst>
+            </a:pPr>
+            <a:r>
+              <a:rPr lang="en-GB" sz="1400" smtClean="0">
+                <a:latin typeface="+mn-lt"/>
+                <a:ea typeface="Calibri" panose="020F0502020204030204" pitchFamily="34" charset="0"/>
+              </a:rPr>
+              <a:t>Dr Adam </a:t>
+            </a:r>
+            <a:r>
+              <a:rPr lang="en-GB" sz="1400" dirty="0">
+                <a:latin typeface="+mn-lt"/>
+                <a:ea typeface="Calibri" panose="020F0502020204030204" pitchFamily="34" charset="0"/>
+              </a:rPr>
+              <a:t>Grzywaczewski is a deep learning solution architect at NVIDIA, where his primary responsibility is to support a wide range of customers in delivery of their deep learning solutions. Adam is an applied research scientist specialising in machine learning with a background in deep learning and system architecture. Previously, he was responsible for building up the UK government’s machine-learning capabilities while at Capgemini and worked in the Jaguar Land Rover Research Centre, where he was responsible for a variety of internal and external projects and contributed to the self-learning car portfolio</a:t>
+            </a:r>
+            <a:r>
+              <a:rPr lang="en-GB" sz="1400" dirty="0" smtClean="0">
+                <a:latin typeface="+mn-lt"/>
+                <a:ea typeface="Calibri" panose="020F0502020204030204" pitchFamily="34" charset="0"/>
+              </a:rPr>
+              <a:t>.</a:t>
+            </a:r>
+            <a:endParaRPr lang="en-GB" sz="1400" dirty="0">
+              <a:effectLst/>
+              <a:latin typeface="+mn-lt"/>
+              <a:ea typeface="Calibri" panose="020F0502020204030204" pitchFamily="34" charset="0"/>
+            </a:endParaRPr>
+          </a:p>
+        </p:txBody>
+      </p:sp>
+    </p:spTree>
+    <p:extLst>
+      <p:ext uri="{BB962C8B-B14F-4D97-AF65-F5344CB8AC3E}">
+        <p14:creationId xmlns:p14="http://schemas.microsoft.com/office/powerpoint/2010/main" val="3662987582"/>
+      </p:ext>
+    </p:extLst>
+  </p:cSld>
+  <p:clrMapOvr>
+    <a:masterClrMapping/>
+  </p:clrMapOvr>
+  <mc:AlternateContent xmlns:mc="http://schemas.openxmlformats.org/markup-compatibility/2006" xmlns:p14="http://schemas.microsoft.com/office/powerpoint/2010/main">
+    <mc:Choice Requires="p14">
+      <p:transition spd="slow" p14:dur="2000"/>
+    </mc:Choice>
+    <mc:Fallback xmlns="">
+      <p:transition spd="slow"/>
+    </mc:Fallback>
+  </mc:AlternateContent>
+  <p:timing>
+    <p:tnLst>
+      <p:par>
+        <p:cTn id="1" dur="indefinite" restart="never" nodeType="tmRoot"/>
+      </p:par>
+    </p:tnLst>
+  </p:timing>
+</p:sld>
+</file>
+
+<file path=ppt/slides/slide7.xml><?xml version="1.0" encoding="utf-8"?>
+<p:sld xmlns:a="http://schemas.openxmlformats.org/drawingml/2006/main" xmlns:r="http://schemas.openxmlformats.org/officeDocument/2006/relationships" xmlns:p="http://schemas.openxmlformats.org/presentationml/2006/main">
+  <p:cSld>
+    <p:spTree>
+      <p:nvGrpSpPr>
+        <p:cNvPr id="1" name=""/>
+        <p:cNvGrpSpPr/>
+        <p:nvPr/>
+      </p:nvGrpSpPr>
+      <p:grpSpPr>
+        <a:xfrm>
+          <a:off x="0" y="0"/>
+          <a:ext cx="0" cy="0"/>
+          <a:chOff x="0" y="0"/>
+          <a:chExt cx="0" cy="0"/>
+        </a:xfrm>
+      </p:grpSpPr>
+      <p:sp>
+        <p:nvSpPr>
+          <p:cNvPr id="2" name="Rectangle 1"/>
+          <p:cNvSpPr/>
+          <p:nvPr/>
+        </p:nvSpPr>
+        <p:spPr>
+          <a:xfrm>
+            <a:off x="539552" y="476673"/>
             <a:ext cx="2952328" cy="461665"/>
           </a:xfrm>
           <a:prstGeom prst="rect">
@@ -7654,10 +8051,6 @@
               </a:rPr>
               <a:t>Working code		- 1 mark.</a:t>
             </a:r>
-            <a:endParaRPr lang="en-GB" sz="1100" dirty="0" smtClean="0">
-              <a:latin typeface="+mj-lt"/>
-              <a:ea typeface="Calibri" panose="020F0502020204030204" pitchFamily="34" charset="0"/>
-            </a:endParaRPr>
           </a:p>
         </p:txBody>
       </p:sp>

</xml_diff>

<commit_message>
Updated docs with link to feedback form
</commit_message>
<xml_diff>
--- a/lectures/pptx/0_Introduction.pptx
+++ b/lectures/pptx/0_Introduction.pptx
@@ -6184,7 +6184,7 @@
                 <a:latin typeface="+mj-lt"/>
                 <a:ea typeface="Calibri" panose="020F0502020204030204" pitchFamily="34" charset="0"/>
               </a:rPr>
-              <a:t>Practical’s supervised by Wes Armour, Ian Bush, Karel Adamek, Ania </a:t>
+              <a:t>Practical’s supervised by Wes Armour, Ian Bush, Karel </a:t>
             </a:r>
             <a:r>
               <a:rPr lang="en-GB" sz="1200" dirty="0" smtClean="0">
@@ -6194,28 +6194,15 @@
                 <a:latin typeface="+mj-lt"/>
                 <a:ea typeface="Calibri" panose="020F0502020204030204" pitchFamily="34" charset="0"/>
               </a:rPr>
-              <a:t>Brown and </a:t>
-            </a:r>
-            <a:r>
-              <a:rPr lang="en-GB" sz="1200" dirty="0">
-                <a:solidFill>
-                  <a:srgbClr val="1F497D"/>
-                </a:solidFill>
-                <a:latin typeface="+mj-lt"/>
-                <a:ea typeface="Calibri" panose="020F0502020204030204" pitchFamily="34" charset="0"/>
-              </a:rPr>
-              <a:t>Jan Novotny</a:t>
-            </a:r>
-            <a:r>
-              <a:rPr lang="en-GB" sz="1200" dirty="0" smtClean="0">
-                <a:solidFill>
-                  <a:srgbClr val="1F497D"/>
-                </a:solidFill>
-                <a:latin typeface="+mj-lt"/>
-                <a:ea typeface="Calibri" panose="020F0502020204030204" pitchFamily="34" charset="0"/>
-              </a:rPr>
-              <a:t>.</a:t>
-            </a:r>
+              <a:t>Adamek.</a:t>
+            </a:r>
+            <a:endParaRPr lang="en-GB" sz="1200" dirty="0" smtClean="0">
+              <a:solidFill>
+                <a:srgbClr val="1F497D"/>
+              </a:solidFill>
+              <a:latin typeface="+mj-lt"/>
+              <a:ea typeface="Calibri" panose="020F0502020204030204" pitchFamily="34" charset="0"/>
+            </a:endParaRPr>
           </a:p>
           <a:p>
             <a:pPr>
@@ -8051,6 +8038,94 @@
               </a:rPr>
               <a:t>Working code		- 1 mark.</a:t>
             </a:r>
+          </a:p>
+        </p:txBody>
+      </p:sp>
+      <p:sp>
+        <p:nvSpPr>
+          <p:cNvPr id="5" name="Rectangle 4"/>
+          <p:cNvSpPr/>
+          <p:nvPr/>
+        </p:nvSpPr>
+        <p:spPr>
+          <a:xfrm>
+            <a:off x="1187624" y="5157192"/>
+            <a:ext cx="6984776" cy="307777"/>
+          </a:xfrm>
+          <a:prstGeom prst="rect">
+            <a:avLst/>
+          </a:prstGeom>
+        </p:spPr>
+        <p:txBody>
+          <a:bodyPr wrap="square">
+            <a:spAutoFit/>
+          </a:bodyPr>
+          <a:lstStyle/>
+          <a:p>
+            <a:pPr lvl="0">
+              <a:spcAft>
+                <a:spcPts val="0"/>
+              </a:spcAft>
+            </a:pPr>
+            <a:r>
+              <a:rPr lang="en-GB" sz="1400" dirty="0">
+                <a:solidFill>
+                  <a:srgbClr val="1F497D"/>
+                </a:solidFill>
+                <a:latin typeface="Arial" panose="020B0604020202020204"/>
+                <a:ea typeface="Calibri" panose="020F0502020204030204" pitchFamily="34" charset="0"/>
+              </a:rPr>
+              <a:t>On-line feedback form: </a:t>
+            </a:r>
+            <a:r>
+              <a:rPr lang="en-GB" sz="1400" dirty="0">
+                <a:solidFill>
+                  <a:srgbClr val="1F497D"/>
+                </a:solidFill>
+                <a:latin typeface="Arial" panose="020B0604020202020204"/>
+                <a:ea typeface="Calibri" panose="020F0502020204030204" pitchFamily="34" charset="0"/>
+                <a:hlinkClick r:id="rId3"/>
+              </a:rPr>
+              <a:t>http://bit.ly/OXUNICWM</a:t>
+            </a:r>
+            <a:r>
+              <a:rPr lang="en-GB" sz="1400" dirty="0">
+                <a:solidFill>
+                  <a:srgbClr val="1F497D"/>
+                </a:solidFill>
+                <a:latin typeface="Arial" panose="020B0604020202020204"/>
+                <a:ea typeface="Calibri" panose="020F0502020204030204" pitchFamily="34" charset="0"/>
+              </a:rPr>
+              <a:t> please, please, please do complete </a:t>
+            </a:r>
+            <a:r>
+              <a:rPr lang="en-GB" sz="1400" dirty="0">
+                <a:solidFill>
+                  <a:srgbClr val="1F497D"/>
+                </a:solidFill>
+                <a:latin typeface="Arial" panose="020B0604020202020204"/>
+                <a:ea typeface="Calibri" panose="020F0502020204030204" pitchFamily="34" charset="0"/>
+                <a:sym typeface="Wingdings" panose="05000000000000000000" pitchFamily="2" charset="2"/>
+              </a:rPr>
+              <a:t></a:t>
+            </a:r>
+            <a:r>
+              <a:rPr lang="en-GB" sz="1400" dirty="0">
+                <a:solidFill>
+                  <a:srgbClr val="1F497D"/>
+                </a:solidFill>
+                <a:latin typeface="Arial" panose="020B0604020202020204"/>
+                <a:ea typeface="Calibri" panose="020F0502020204030204" pitchFamily="34" charset="0"/>
+              </a:rPr>
+              <a:t> </a:t>
+            </a:r>
+            <a:endParaRPr lang="en-GB" sz="1400" dirty="0">
+              <a:solidFill>
+                <a:srgbClr val="C2470C"/>
+              </a:solidFill>
+              <a:latin typeface="Arial" panose="020B0604020202020204"/>
+              <a:ea typeface="Calibri" panose="020F0502020204030204" pitchFamily="34" charset="0"/>
+            </a:endParaRPr>
           </a:p>
         </p:txBody>
       </p:sp>
@@ -8388,7 +8463,7 @@
         <a:effectLst/>
         <a:extLst>
           <a:ext uri="{AF507438-7753-43e0-B8FC-AC1667EBCBE1}">
-            <a14:hiddenEffects xmlns:a14="http://schemas.microsoft.com/office/drawing/2010/main" xmlns="">
+            <a14:hiddenEffects xmlns="" xmlns:a14="http://schemas.microsoft.com/office/drawing/2010/main">
               <a:effectLst>
                 <a:outerShdw blurRad="63500" dist="38099" dir="2700000" algn="ctr" rotWithShape="0">
                   <a:schemeClr val="bg2">
@@ -8464,7 +8539,7 @@
         <a:effectLst/>
         <a:extLst>
           <a:ext uri="{AF507438-7753-43e0-B8FC-AC1667EBCBE1}">
-            <a14:hiddenEffects xmlns:a14="http://schemas.microsoft.com/office/drawing/2010/main" xmlns="">
+            <a14:hiddenEffects xmlns="" xmlns:a14="http://schemas.microsoft.com/office/drawing/2010/main">
               <a:effectLst>
                 <a:outerShdw blurRad="63500" dist="38099" dir="2700000" algn="ctr" rotWithShape="0">
                   <a:schemeClr val="bg2">
@@ -9527,12 +9602,12 @@
 </file>
 
 <file path=customXml/item1.xml><?xml version="1.0" encoding="utf-8"?>
-<p:properties xmlns:p="http://schemas.microsoft.com/office/2006/metadata/properties" xmlns:xsi="http://www.w3.org/2001/XMLSchema-instance" xmlns:pc="http://schemas.microsoft.com/office/infopath/2007/PartnerControls">
-  <documentManagement>
-    <PublishingExpirationDate xmlns="http://schemas.microsoft.com/sharepoint/v3" xsi:nil="true"/>
-    <PublishingStartDate xmlns="http://schemas.microsoft.com/sharepoint/v3" xsi:nil="true"/>
-  </documentManagement>
-</p:properties>
+<?mso-contentType ?>
+<FormTemplates xmlns="http://schemas.microsoft.com/sharepoint/v3/contenttype/forms">
+  <Display>DocumentLibraryForm</Display>
+  <Edit>DocumentLibraryForm</Edit>
+  <New>DocumentLibraryForm</New>
+</FormTemplates>
 </file>
 
 <file path=customXml/item2.xml><?xml version="1.0" encoding="utf-8"?>
@@ -9668,26 +9743,18 @@
 </file>
 
 <file path=customXml/item3.xml><?xml version="1.0" encoding="utf-8"?>
-<?mso-contentType ?>
-<FormTemplates xmlns="http://schemas.microsoft.com/sharepoint/v3/contenttype/forms">
-  <Display>DocumentLibraryForm</Display>
-  <Edit>DocumentLibraryForm</Edit>
-  <New>DocumentLibraryForm</New>
-</FormTemplates>
+<p:properties xmlns:p="http://schemas.microsoft.com/office/2006/metadata/properties" xmlns:xsi="http://www.w3.org/2001/XMLSchema-instance" xmlns:pc="http://schemas.microsoft.com/office/infopath/2007/PartnerControls">
+  <documentManagement>
+    <PublishingExpirationDate xmlns="http://schemas.microsoft.com/sharepoint/v3" xsi:nil="true"/>
+    <PublishingStartDate xmlns="http://schemas.microsoft.com/sharepoint/v3" xsi:nil="true"/>
+  </documentManagement>
+</p:properties>
 </file>
 
 <file path=customXml/itemProps1.xml><?xml version="1.0" encoding="utf-8"?>
-<ds:datastoreItem xmlns:ds="http://schemas.openxmlformats.org/officeDocument/2006/customXml" ds:itemID="{D83787E9-855B-43BD-8382-B7C63B9BC33D}">
+<ds:datastoreItem xmlns:ds="http://schemas.openxmlformats.org/officeDocument/2006/customXml" ds:itemID="{2E0637EC-CEA5-409F-B139-003005A14145}">
   <ds:schemaRefs>
-    <ds:schemaRef ds:uri="http://schemas.microsoft.com/office/2006/metadata/properties"/>
-    <ds:schemaRef ds:uri="http://schemas.microsoft.com/sharepoint/v3"/>
-    <ds:schemaRef ds:uri="http://purl.org/dc/terms/"/>
-    <ds:schemaRef ds:uri="http://schemas.openxmlformats.org/package/2006/metadata/core-properties"/>
-    <ds:schemaRef ds:uri="http://schemas.microsoft.com/office/2006/documentManagement/types"/>
-    <ds:schemaRef ds:uri="http://schemas.microsoft.com/office/infopath/2007/PartnerControls"/>
-    <ds:schemaRef ds:uri="http://purl.org/dc/elements/1.1/"/>
-    <ds:schemaRef ds:uri="http://www.w3.org/XML/1998/namespace"/>
-    <ds:schemaRef ds:uri="http://purl.org/dc/dcmitype/"/>
+    <ds:schemaRef ds:uri="http://schemas.microsoft.com/sharepoint/v3/contenttype/forms"/>
   </ds:schemaRefs>
 </ds:datastoreItem>
 </file>
@@ -9711,9 +9778,17 @@
 </file>
 
 <file path=customXml/itemProps3.xml><?xml version="1.0" encoding="utf-8"?>
-<ds:datastoreItem xmlns:ds="http://schemas.openxmlformats.org/officeDocument/2006/customXml" ds:itemID="{2E0637EC-CEA5-409F-B139-003005A14145}">
+<ds:datastoreItem xmlns:ds="http://schemas.openxmlformats.org/officeDocument/2006/customXml" ds:itemID="{D83787E9-855B-43BD-8382-B7C63B9BC33D}">
   <ds:schemaRefs>
-    <ds:schemaRef ds:uri="http://schemas.microsoft.com/sharepoint/v3/contenttype/forms"/>
+    <ds:schemaRef ds:uri="http://schemas.microsoft.com/office/2006/metadata/properties"/>
+    <ds:schemaRef ds:uri="http://schemas.microsoft.com/sharepoint/v3"/>
+    <ds:schemaRef ds:uri="http://purl.org/dc/terms/"/>
+    <ds:schemaRef ds:uri="http://schemas.openxmlformats.org/package/2006/metadata/core-properties"/>
+    <ds:schemaRef ds:uri="http://schemas.microsoft.com/office/2006/documentManagement/types"/>
+    <ds:schemaRef ds:uri="http://schemas.microsoft.com/office/infopath/2007/PartnerControls"/>
+    <ds:schemaRef ds:uri="http://purl.org/dc/elements/1.1/"/>
+    <ds:schemaRef ds:uri="http://www.w3.org/XML/1998/namespace"/>
+    <ds:schemaRef ds:uri="http://purl.org/dc/dcmitype/"/>
   </ds:schemaRefs>
 </ds:datastoreItem>
 </file>
</xml_diff>